<commit_message>
This is Portfolio for my Track Machine Learning .
</commit_message>
<xml_diff>
--- a/New Portfolio Mohamed Ayman.pptx
+++ b/New Portfolio Mohamed Ayman.pptx
@@ -20,42 +20,42 @@
   <p:notesSz cx="6858000" cy="9144000"/>
   <p:embeddedFontLst>
     <p:embeddedFont>
-      <p:font typeface="Canva Sans Italics" charset="0"/>
+      <p:font typeface="Futura Display" charset="0"/>
       <p:regular r:id="rId12"/>
     </p:embeddedFont>
     <p:embeddedFont>
-      <p:font typeface="Arial Unicode" charset="-128"/>
+      <p:font typeface="Canva Sans" charset="0"/>
       <p:regular r:id="rId13"/>
     </p:embeddedFont>
     <p:embeddedFont>
-      <p:font typeface="Canva Sans" charset="0"/>
+      <p:font typeface="Mr Dafoe" charset="0"/>
       <p:regular r:id="rId14"/>
     </p:embeddedFont>
     <p:embeddedFont>
-      <p:font typeface="Calibri" pitchFamily="34" charset="0"/>
+      <p:font typeface="Arial Unicode" charset="-128"/>
       <p:regular r:id="rId15"/>
-      <p:bold r:id="rId16"/>
-      <p:italic r:id="rId17"/>
-      <p:boldItalic r:id="rId18"/>
+    </p:embeddedFont>
+    <p:embeddedFont>
+      <p:font typeface="Canva Sans Bold" charset="0"/>
+      <p:regular r:id="rId16"/>
+    </p:embeddedFont>
+    <p:embeddedFont>
+      <p:font typeface="Canva Sans Bold Italics" charset="0"/>
+      <p:regular r:id="rId17"/>
     </p:embeddedFont>
     <p:embeddedFont>
       <p:font typeface="Arial Unicode Bold" charset="-128"/>
-      <p:regular r:id="rId19"/>
+      <p:regular r:id="rId18"/>
     </p:embeddedFont>
     <p:embeddedFont>
-      <p:font typeface="Futura Display" charset="0"/>
-      <p:regular r:id="rId20"/>
+      <p:font typeface="Calibri" pitchFamily="34" charset="0"/>
+      <p:regular r:id="rId19"/>
+      <p:bold r:id="rId20"/>
+      <p:italic r:id="rId21"/>
+      <p:boldItalic r:id="rId22"/>
     </p:embeddedFont>
     <p:embeddedFont>
-      <p:font typeface="Canva Sans Bold Italics" charset="0"/>
-      <p:regular r:id="rId21"/>
-    </p:embeddedFont>
-    <p:embeddedFont>
-      <p:font typeface="Canva Sans Bold" charset="0"/>
-      <p:regular r:id="rId22"/>
-    </p:embeddedFont>
-    <p:embeddedFont>
-      <p:font typeface="Mr Dafoe" charset="0"/>
+      <p:font typeface="Canva Sans Italics" charset="0"/>
       <p:regular r:id="rId23"/>
     </p:embeddedFont>
   </p:embeddedFontLst>
@@ -9468,7 +9468,7 @@
                                           </p:stCondLst>
                                         </p:cTn>
                                         <p:tgtEl>
-                                          <p:spTgt spid="6"/>
+                                          <p:spTgt spid="5"/>
                                         </p:tgtEl>
                                         <p:attrNameLst>
                                           <p:attrName>style.visibility</p:attrName>
@@ -9482,7 +9482,7 @@
                                       <p:cBhvr>
                                         <p:cTn id="24" dur="500"/>
                                         <p:tgtEl>
-                                          <p:spTgt spid="6"/>
+                                          <p:spTgt spid="5"/>
                                         </p:tgtEl>
                                       </p:cBhvr>
                                     </p:animEffect>
@@ -9508,7 +9508,7 @@
                             </p:stCondLst>
                             <p:childTnLst>
                               <p:par>
-                                <p:cTn id="27" presetID="16" presetClass="entr" presetSubtype="21" fill="hold" grpId="0" nodeType="clickEffect">
+                                <p:cTn id="27" presetID="22" presetClass="entr" presetSubtype="4" fill="hold" grpId="0" nodeType="clickEffect">
                                   <p:stCondLst>
                                     <p:cond delay="0"/>
                                   </p:stCondLst>
@@ -9516,6 +9516,59 @@
                                     <p:set>
                                       <p:cBhvr>
                                         <p:cTn id="28" dur="1" fill="hold">
+                                          <p:stCondLst>
+                                            <p:cond delay="0"/>
+                                          </p:stCondLst>
+                                        </p:cTn>
+                                        <p:tgtEl>
+                                          <p:spTgt spid="6"/>
+                                        </p:tgtEl>
+                                        <p:attrNameLst>
+                                          <p:attrName>style.visibility</p:attrName>
+                                        </p:attrNameLst>
+                                      </p:cBhvr>
+                                      <p:to>
+                                        <p:strVal val="visible"/>
+                                      </p:to>
+                                    </p:set>
+                                    <p:animEffect transition="in" filter="wipe(down)">
+                                      <p:cBhvr>
+                                        <p:cTn id="29" dur="500"/>
+                                        <p:tgtEl>
+                                          <p:spTgt spid="6"/>
+                                        </p:tgtEl>
+                                      </p:cBhvr>
+                                    </p:animEffect>
+                                  </p:childTnLst>
+                                </p:cTn>
+                              </p:par>
+                            </p:childTnLst>
+                          </p:cTn>
+                        </p:par>
+                      </p:childTnLst>
+                    </p:cTn>
+                  </p:par>
+                  <p:par>
+                    <p:cTn id="30" fill="hold">
+                      <p:stCondLst>
+                        <p:cond delay="indefinite"/>
+                      </p:stCondLst>
+                      <p:childTnLst>
+                        <p:par>
+                          <p:cTn id="31" fill="hold">
+                            <p:stCondLst>
+                              <p:cond delay="0"/>
+                            </p:stCondLst>
+                            <p:childTnLst>
+                              <p:par>
+                                <p:cTn id="32" presetID="22" presetClass="entr" presetSubtype="4" fill="hold" grpId="0" nodeType="clickEffect">
+                                  <p:stCondLst>
+                                    <p:cond delay="0"/>
+                                  </p:stCondLst>
+                                  <p:childTnLst>
+                                    <p:set>
+                                      <p:cBhvr>
+                                        <p:cTn id="33" dur="1" fill="hold">
                                           <p:stCondLst>
                                             <p:cond delay="0"/>
                                           </p:stCondLst>
@@ -9531,9 +9584,9 @@
                                         <p:strVal val="visible"/>
                                       </p:to>
                                     </p:set>
-                                    <p:animEffect transition="in" filter="barn(inVertical)">
+                                    <p:animEffect transition="in" filter="wipe(down)">
                                       <p:cBhvr>
-                                        <p:cTn id="29" dur="500"/>
+                                        <p:cTn id="34" dur="500"/>
                                         <p:tgtEl>
                                           <p:spTgt spid="7"/>
                                         </p:tgtEl>
@@ -9573,6 +9626,7 @@
       <p:bldP spid="2" grpId="0"/>
       <p:bldP spid="3" grpId="0"/>
       <p:bldP spid="4" grpId="0"/>
+      <p:bldP spid="5" grpId="0"/>
       <p:bldP spid="6" grpId="0"/>
       <p:bldP spid="7" grpId="0"/>
     </p:bldLst>
@@ -11691,19 +11745,7 @@
                 <a:cs typeface="Canva Sans Bold Italics"/>
                 <a:sym typeface="Canva Sans Bold Italics"/>
               </a:rPr>
-              <a:t>    </a:t>
-            </a:r>
-            <a:r>
-              <a:rPr lang="en-US" sz="5000" smtClean="0">
-                <a:solidFill>
-                  <a:srgbClr val="000000"/>
-                </a:solidFill>
-                <a:latin typeface="Canva Sans Bold Italics"/>
-                <a:ea typeface="Canva Sans Bold Italics"/>
-                <a:cs typeface="Canva Sans Bold Italics"/>
-                <a:sym typeface="Canva Sans Bold Italics"/>
-              </a:rPr>
-              <a:t>   </a:t>
+              <a:t>       </a:t>
             </a:r>
             <a:r>
               <a:rPr lang="en-US" sz="5000" u="sng" smtClean="0">
@@ -11741,15 +11783,6 @@
               </a:rPr>
               <a:t>               </a:t>
             </a:r>
-            <a:endParaRPr lang="en-US" sz="5000" dirty="0" smtClean="0">
-              <a:solidFill>
-                <a:srgbClr val="000000"/>
-              </a:solidFill>
-              <a:latin typeface="Canva Sans Bold Italics"/>
-              <a:ea typeface="Canva Sans Bold Italics"/>
-              <a:cs typeface="Canva Sans Bold Italics"/>
-              <a:sym typeface="Canva Sans Bold Italics"/>
-            </a:endParaRPr>
           </a:p>
           <a:p>
             <a:pPr algn="ctr">
@@ -11767,19 +11800,7 @@
                 <a:cs typeface="Canva Sans Bold Italics"/>
                 <a:sym typeface="Canva Sans Bold Italics"/>
               </a:rPr>
-              <a:t>                     </a:t>
-            </a:r>
-            <a:r>
-              <a:rPr lang="en-US" sz="3600" dirty="0" smtClean="0">
-                <a:solidFill>
-                  <a:srgbClr val="000000"/>
-                </a:solidFill>
-                <a:latin typeface="Canva Sans Bold Italics"/>
-                <a:ea typeface="Canva Sans Bold Italics"/>
-                <a:cs typeface="Canva Sans Bold Italics"/>
-                <a:sym typeface="Canva Sans Bold Italics"/>
-              </a:rPr>
-              <a:t>1- </a:t>
+              <a:t>                     1- </a:t>
             </a:r>
             <a:r>
               <a:rPr lang="en-US" sz="3600" dirty="0" err="1" smtClean="0">
@@ -11846,19 +11867,7 @@
                 <a:cs typeface="Canva Sans Bold Italics"/>
                 <a:sym typeface="Canva Sans Bold Italics"/>
               </a:rPr>
-              <a:t>                        </a:t>
-            </a:r>
-            <a:r>
-              <a:rPr lang="en-US" sz="3600" dirty="0" smtClean="0">
-                <a:solidFill>
-                  <a:srgbClr val="000000"/>
-                </a:solidFill>
-                <a:latin typeface="Canva Sans Bold Italics"/>
-                <a:ea typeface="Canva Sans Bold Italics"/>
-                <a:cs typeface="Canva Sans Bold Italics"/>
-                <a:sym typeface="Canva Sans Bold Italics"/>
-              </a:rPr>
-              <a:t>2- </a:t>
+              <a:t>                        2- </a:t>
             </a:r>
             <a:r>
               <a:rPr lang="en-US" sz="3600" dirty="0" err="1">
@@ -11913,31 +11922,7 @@
                 <a:cs typeface="Canva Sans Bold Italics"/>
                 <a:sym typeface="Canva Sans Bold Italics"/>
               </a:rPr>
-              <a:t>               </a:t>
-            </a:r>
-            <a:r>
-              <a:rPr lang="en-US" sz="3600" dirty="0" smtClean="0">
-                <a:solidFill>
-                  <a:srgbClr val="000000"/>
-                </a:solidFill>
-                <a:latin typeface="Canva Sans Bold Italics"/>
-                <a:ea typeface="Canva Sans Bold Italics"/>
-                <a:cs typeface="Canva Sans Bold Italics"/>
-                <a:sym typeface="Canva Sans Bold Italics"/>
-              </a:rPr>
-              <a:t>                  </a:t>
-            </a:r>
-            <a:r>
-              <a:rPr lang="en-US" sz="3600" dirty="0" smtClean="0">
-                <a:solidFill>
-                  <a:srgbClr val="000000"/>
-                </a:solidFill>
-                <a:latin typeface="Canva Sans Bold Italics"/>
-                <a:ea typeface="Canva Sans Bold Italics"/>
-                <a:cs typeface="Canva Sans Bold Italics"/>
-                <a:sym typeface="Canva Sans Bold Italics"/>
-              </a:rPr>
-              <a:t>3- </a:t>
+              <a:t>                                 3- </a:t>
             </a:r>
             <a:r>
               <a:rPr lang="en-US" sz="3600" dirty="0" err="1">

</xml_diff>